<commit_message>
fixes in lesson 1
</commit_message>
<xml_diff>
--- a/lesson 1/Lesson 1 Python.pptx
+++ b/lesson 1/Lesson 1 Python.pptx
@@ -24373,7 +24373,7 @@
             <a:pPr marL="0" indent="0"/>
             <a:r>
               <a:rPr lang="el-GR" dirty="0"/>
-              <a:t>Για να δούμε μια συγκεκριμένη μεταβλητή μέσα σε έναν πίνακα χρησιμοποιούμε την θέση του αντικειμένου που μα ενδιαφέρει πχ</a:t>
+              <a:t>Για να δούμε μια συγκεκριμένη μεταβλητή μέσα σε έναν πίνακα χρησιμοποιούμε την θέση του αντικειμένου που μας ενδιαφέρει πχ</a:t>
             </a:r>
             <a:endParaRPr lang="en-US" dirty="0"/>
           </a:p>
@@ -24418,7 +24418,7 @@
         </p:nvSpPr>
         <p:spPr>
           <a:xfrm flipH="1">
-            <a:off x="4183933" y="3250478"/>
+            <a:off x="3897575" y="3250478"/>
             <a:ext cx="5085962" cy="1583602"/>
           </a:xfrm>
           <a:prstGeom prst="rect">
@@ -24692,7 +24692,7 @@
             </a:r>
             <a:r>
               <a:rPr lang="el-GR" dirty="0"/>
-              <a:t>Οι τιμές ξεκινάν </a:t>
+              <a:t>Οι θέσεις ξεκινάν </a:t>
             </a:r>
             <a:r>
               <a:rPr lang="el-GR" dirty="0" err="1"/>
@@ -24749,52 +24749,32 @@
           <a:p>
             <a:pPr marL="0" indent="0"/>
             <a:r>
-              <a:rPr lang="el-GR" dirty="0">
-                <a:solidFill>
-                  <a:schemeClr val="tx2"/>
+              <a:rPr lang="en-US" dirty="0">
+                <a:solidFill>
+                  <a:schemeClr val="accent2"/>
                 </a:solidFill>
               </a:rPr>
-              <a:t>Προσοχή! </a:t>
+              <a:t>Tip</a:t>
             </a:r>
             <a:r>
-              <a:rPr lang="en-US" dirty="0"/>
-              <a:t>0</a:t>
+              <a:rPr lang="el-GR" dirty="0">
+                <a:solidFill>
+                  <a:schemeClr val="accent2"/>
+                </a:solidFill>
+              </a:rPr>
+              <a:t>! </a:t>
             </a:r>
             <a:r>
               <a:rPr lang="el-GR" dirty="0"/>
-              <a:t>-3 καθώς θα σταματήσει στο 4ο </a:t>
+              <a:t>Καλό είναι για καλύτερη κατανόηση να λέμε το αντικείμενο στην θέση 0 και όχι το 1</a:t>
             </a:r>
             <a:r>
-              <a:rPr lang="el-GR" dirty="0" err="1"/>
-              <a:t>item</a:t>
-            </a:r>
-            <a:endParaRPr lang="el-GR" dirty="0"/>
-          </a:p>
-          <a:p>
-            <a:pPr marL="0" indent="0"/>
-            <a:r>
-              <a:rPr lang="el-GR" dirty="0"/>
-              <a:t>αν βάζαμε </a:t>
-            </a:r>
-            <a:r>
-              <a:rPr lang="en-US" dirty="0"/>
-              <a:t>2</a:t>
-            </a:r>
-            <a:r>
-              <a:rPr lang="el-GR"/>
-              <a:t> </a:t>
+              <a:rPr lang="el-GR" baseline="30000" dirty="0"/>
+              <a:t>ο</a:t>
             </a:r>
             <a:r>
               <a:rPr lang="el-GR" dirty="0"/>
-              <a:t>θα έδειχνε το 1ο και το 2ο </a:t>
-            </a:r>
-            <a:r>
-              <a:rPr lang="el-GR" dirty="0" err="1"/>
-              <a:t>item</a:t>
-            </a:r>
-            <a:r>
-              <a:rPr lang="el-GR" dirty="0"/>
-              <a:t>.</a:t>
+              <a:t> αντικείμενο</a:t>
             </a:r>
           </a:p>
         </p:txBody>
@@ -28406,6 +28386,72 @@
               <a:rPr lang="el-GR" dirty="0"/>
               <a:t>)</a:t>
             </a:r>
+            <a:endParaRPr lang="en-US" dirty="0"/>
+          </a:p>
+          <a:p>
+            <a:pPr marL="0" lvl="0" indent="0" algn="ctr" rtl="0">
+              <a:spcBef>
+                <a:spcPts val="0"/>
+              </a:spcBef>
+              <a:spcAft>
+                <a:spcPts val="0"/>
+              </a:spcAft>
+              <a:buNone/>
+            </a:pPr>
+            <a:endParaRPr lang="en-US" dirty="0"/>
+          </a:p>
+          <a:p>
+            <a:pPr marL="0" lvl="0" indent="0" algn="ctr" rtl="0">
+              <a:spcBef>
+                <a:spcPts val="0"/>
+              </a:spcBef>
+              <a:spcAft>
+                <a:spcPts val="0"/>
+              </a:spcAft>
+              <a:buNone/>
+            </a:pPr>
+            <a:r>
+              <a:rPr lang="el-GR" dirty="0"/>
+              <a:t>Μπορεί να μεταφραστεί ως: </a:t>
+            </a:r>
+          </a:p>
+          <a:p>
+            <a:pPr marL="0" lvl="0" indent="0" algn="ctr" rtl="0">
+              <a:spcBef>
+                <a:spcPts val="0"/>
+              </a:spcBef>
+              <a:spcAft>
+                <a:spcPts val="0"/>
+              </a:spcAft>
+              <a:buNone/>
+            </a:pPr>
+            <a:r>
+              <a:rPr lang="el-GR" dirty="0"/>
+              <a:t>Για κάθε αντικείμενο στη </a:t>
+            </a:r>
+            <a:r>
+              <a:rPr lang="el-GR" dirty="0" err="1"/>
+              <a:t>λιστα</a:t>
+            </a:r>
+            <a:r>
+              <a:rPr lang="el-GR" dirty="0"/>
+              <a:t>… </a:t>
+            </a:r>
+          </a:p>
+          <a:p>
+            <a:pPr marL="0" lvl="0" indent="0" algn="ctr" rtl="0">
+              <a:spcBef>
+                <a:spcPts val="0"/>
+              </a:spcBef>
+              <a:spcAft>
+                <a:spcPts val="0"/>
+              </a:spcAft>
+              <a:buNone/>
+            </a:pPr>
+            <a:r>
+              <a:rPr lang="el-GR" dirty="0"/>
+              <a:t>κάνε κάτι </a:t>
+            </a:r>
           </a:p>
           <a:p>
             <a:pPr marL="0" lvl="0" indent="0" algn="ctr" rtl="0">
@@ -28474,8 +28520,8 @@
         </p:nvSpPr>
         <p:spPr>
           <a:xfrm>
-            <a:off x="6070225" y="2149800"/>
-            <a:ext cx="2226600" cy="843900"/>
+            <a:off x="5894269" y="2013377"/>
+            <a:ext cx="2578512" cy="843900"/>
           </a:xfrm>
           <a:prstGeom prst="rect">
             <a:avLst/>
@@ -28498,8 +28544,25 @@
             </a:pPr>
             <a:r>
               <a:rPr lang="el-GR" dirty="0"/>
-              <a:t>Όταν θέλουμε συγκεκριμένα αντικείμενα από την λίστα</a:t>
+              <a:t>Γενικότερη χρήση από το </a:t>
             </a:r>
+            <a:r>
+              <a:rPr lang="en-US" dirty="0"/>
+              <a:t>for item in list. </a:t>
+            </a:r>
+            <a:r>
+              <a:rPr lang="el-GR" dirty="0"/>
+              <a:t>Εδώ δεν έχουμε πρόσβαση στο αντικείμενο αλλά σε μια τιμή που μπορεί να </a:t>
+            </a:r>
+            <a:r>
+              <a:rPr lang="el-GR" b="1" dirty="0"/>
+              <a:t>δείξει </a:t>
+            </a:r>
+            <a:r>
+              <a:rPr lang="el-GR" dirty="0"/>
+              <a:t>σε μία θέση εντός της λίστας</a:t>
+            </a:r>
+            <a:endParaRPr lang="el-GR" b="1" dirty="0"/>
           </a:p>
           <a:p>
             <a:pPr marL="0" lvl="0" indent="0" algn="ctr" rtl="0">
@@ -28577,6 +28640,76 @@
             <a:r>
               <a:rPr lang="el-GR" dirty="0"/>
               <a:t>[i])</a:t>
+            </a:r>
+          </a:p>
+          <a:p>
+            <a:pPr marL="0" lvl="0" indent="0" algn="ctr" rtl="0">
+              <a:spcBef>
+                <a:spcPts val="0"/>
+              </a:spcBef>
+              <a:spcAft>
+                <a:spcPts val="0"/>
+              </a:spcAft>
+              <a:buNone/>
+            </a:pPr>
+            <a:endParaRPr lang="el-GR" dirty="0"/>
+          </a:p>
+          <a:p>
+            <a:pPr marL="0" lvl="0" indent="0" algn="ctr" rtl="0">
+              <a:spcBef>
+                <a:spcPts val="0"/>
+              </a:spcBef>
+              <a:spcAft>
+                <a:spcPts val="0"/>
+              </a:spcAft>
+              <a:buNone/>
+            </a:pPr>
+            <a:r>
+              <a:rPr lang="el-GR" dirty="0"/>
+              <a:t>Για μια </a:t>
+            </a:r>
+            <a:r>
+              <a:rPr lang="el-GR" dirty="0" err="1"/>
+              <a:t>μεταβλήτή</a:t>
+            </a:r>
+            <a:r>
+              <a:rPr lang="el-GR" dirty="0"/>
+              <a:t> </a:t>
+            </a:r>
+            <a:r>
+              <a:rPr lang="en-US" dirty="0" err="1"/>
+              <a:t>i</a:t>
+            </a:r>
+            <a:r>
+              <a:rPr lang="en-US" dirty="0"/>
+              <a:t> </a:t>
+            </a:r>
+            <a:r>
+              <a:rPr lang="el-GR" dirty="0"/>
+              <a:t>από τιμές 1 </a:t>
+            </a:r>
+            <a:r>
+              <a:rPr lang="el-GR" dirty="0" err="1"/>
+              <a:t>εως</a:t>
+            </a:r>
+            <a:r>
+              <a:rPr lang="el-GR" dirty="0"/>
+              <a:t> μήκος λίστας…</a:t>
+            </a:r>
+          </a:p>
+          <a:p>
+            <a:pPr marL="0" lvl="0" indent="0" algn="ctr" rtl="0">
+              <a:spcBef>
+                <a:spcPts val="0"/>
+              </a:spcBef>
+              <a:spcAft>
+                <a:spcPts val="0"/>
+              </a:spcAft>
+              <a:buNone/>
+            </a:pPr>
+            <a:r>
+              <a:rPr lang="el-GR" dirty="0"/>
+              <a:t>Κάνε κάτι </a:t>
             </a:r>
             <a:endParaRPr lang="en-US" dirty="0"/>
           </a:p>
@@ -29039,7 +29172,15 @@
             </a:r>
             <a:r>
               <a:rPr lang="el-GR" dirty="0"/>
-              <a:t> συγκρίνουν με βάση την αλφαβητική σειρά των γραμμάτων)</a:t>
+              <a:t> συγκρίνουν με βάση την αλφαβητική σειρά των γραμμάτων με βάση την κωδικοποίηση </a:t>
+            </a:r>
+            <a:r>
+              <a:rPr lang="en-US" dirty="0"/>
+              <a:t>ASCII</a:t>
+            </a:r>
+            <a:r>
+              <a:rPr lang="el-GR" dirty="0"/>
+              <a:t>)</a:t>
             </a:r>
           </a:p>
           <a:p>
@@ -29196,7 +29337,30 @@
             </a:pPr>
             <a:r>
               <a:rPr lang="el-GR" dirty="0"/>
-              <a:t>Χρησιμοποιείται για να φέρει το άθροισμα των τιμών μιας λίστας. Χρησιμοποιείται κυρίως σε αριθμητικές λίστες.</a:t>
+              <a:t>Χρησιμοποιείται για να φέρει το άθροισμα των τιμών μιας λίστας. </a:t>
+            </a:r>
+          </a:p>
+          <a:p>
+            <a:pPr marL="0" lvl="0" indent="0" algn="ctr" rtl="0">
+              <a:spcBef>
+                <a:spcPts val="0"/>
+              </a:spcBef>
+              <a:spcAft>
+                <a:spcPts val="0"/>
+              </a:spcAft>
+              <a:buNone/>
+            </a:pPr>
+            <a:r>
+              <a:rPr lang="el-GR" dirty="0"/>
+              <a:t>Δεν λειτουργεί σε λίστες με </a:t>
+            </a:r>
+            <a:r>
+              <a:rPr lang="en-US" dirty="0"/>
+              <a:t>string</a:t>
+            </a:r>
+            <a:r>
+              <a:rPr lang="el-GR" dirty="0"/>
+              <a:t>.</a:t>
             </a:r>
           </a:p>
         </p:txBody>

</xml_diff>